<commit_message>
added accuracy to validation; presentation edited
</commit_message>
<xml_diff>
--- a/presentation/final-presentation.pptx
+++ b/presentation/final-presentation.pptx
@@ -213,7 +213,7 @@
           <a:p>
             <a:fld id="{D9522A34-48A8-419F-8C60-74DE1EEA5C9D}" type="datetimeFigureOut">
               <a:rPr lang="de-DE" smtClean="0"/>
-              <a:t>02.12.2015</a:t>
+              <a:t>03.12.2015</a:t>
             </a:fld>
             <a:endParaRPr lang="de-DE"/>
           </a:p>
@@ -383,7 +383,7 @@
           <a:p>
             <a:fld id="{D6BACB08-FE7C-4BD9-9EB3-A399FA0979C0}" type="datetimeFigureOut">
               <a:rPr lang="de-DE" smtClean="0"/>
-              <a:t>02.12.2015</a:t>
+              <a:t>03.12.2015</a:t>
             </a:fld>
             <a:endParaRPr lang="de-DE"/>
           </a:p>
@@ -1047,7 +1047,7 @@
           <a:p>
             <a:fld id="{49DCC5FE-DA0C-4B19-BFBA-6C1FDB685C85}" type="datetime1">
               <a:rPr lang="de-DE" smtClean="0"/>
-              <a:t>02.12.2015</a:t>
+              <a:t>03.12.2015</a:t>
             </a:fld>
             <a:endParaRPr lang="de-DE"/>
           </a:p>
@@ -1221,7 +1221,7 @@
           <a:p>
             <a:fld id="{40D6EE06-75E9-4958-923C-8446AACBB60D}" type="datetime1">
               <a:rPr lang="de-DE" smtClean="0"/>
-              <a:t>02.12.2015</a:t>
+              <a:t>03.12.2015</a:t>
             </a:fld>
             <a:endParaRPr lang="de-DE"/>
           </a:p>
@@ -1405,7 +1405,7 @@
           <a:p>
             <a:fld id="{029877EC-1C40-498B-9AB4-593BA7DC3DC9}" type="datetime1">
               <a:rPr lang="de-DE" smtClean="0"/>
-              <a:t>02.12.2015</a:t>
+              <a:t>03.12.2015</a:t>
             </a:fld>
             <a:endParaRPr lang="de-DE"/>
           </a:p>
@@ -1579,7 +1579,7 @@
           <a:p>
             <a:fld id="{B56A4490-B7AE-49FE-BF90-01EEF811007E}" type="datetime1">
               <a:rPr lang="de-DE" smtClean="0"/>
-              <a:t>02.12.2015</a:t>
+              <a:t>03.12.2015</a:t>
             </a:fld>
             <a:endParaRPr lang="de-DE"/>
           </a:p>
@@ -1829,7 +1829,7 @@
           <a:p>
             <a:fld id="{C78779CF-EA24-44A0-81A3-58A4B9B76AD7}" type="datetime1">
               <a:rPr lang="de-DE" smtClean="0"/>
-              <a:t>02.12.2015</a:t>
+              <a:t>03.12.2015</a:t>
             </a:fld>
             <a:endParaRPr lang="de-DE"/>
           </a:p>
@@ -2121,7 +2121,7 @@
           <a:p>
             <a:fld id="{F44AF651-1E63-4EC8-BADE-0A804868EEFA}" type="datetime1">
               <a:rPr lang="de-DE" smtClean="0"/>
-              <a:t>02.12.2015</a:t>
+              <a:t>03.12.2015</a:t>
             </a:fld>
             <a:endParaRPr lang="de-DE"/>
           </a:p>
@@ -2547,7 +2547,7 @@
           <a:p>
             <a:fld id="{2ABCC6F0-2D48-4A51-9D06-D47339C3150B}" type="datetime1">
               <a:rPr lang="de-DE" smtClean="0"/>
-              <a:t>02.12.2015</a:t>
+              <a:t>03.12.2015</a:t>
             </a:fld>
             <a:endParaRPr lang="de-DE"/>
           </a:p>
@@ -2669,7 +2669,7 @@
           <a:p>
             <a:fld id="{A709E3C5-08F4-4442-B494-92CB7A3C76C6}" type="datetime1">
               <a:rPr lang="de-DE" smtClean="0"/>
-              <a:t>02.12.2015</a:t>
+              <a:t>03.12.2015</a:t>
             </a:fld>
             <a:endParaRPr lang="de-DE"/>
           </a:p>
@@ -2768,7 +2768,7 @@
           <a:p>
             <a:fld id="{9A839533-1C17-4715-A057-E080E795F655}" type="datetime1">
               <a:rPr lang="de-DE" smtClean="0"/>
-              <a:t>02.12.2015</a:t>
+              <a:t>03.12.2015</a:t>
             </a:fld>
             <a:endParaRPr lang="de-DE"/>
           </a:p>
@@ -3049,7 +3049,7 @@
           <a:p>
             <a:fld id="{EFA32D8B-51E4-4291-B9BB-6D45ED354549}" type="datetime1">
               <a:rPr lang="de-DE" smtClean="0"/>
-              <a:t>02.12.2015</a:t>
+              <a:t>03.12.2015</a:t>
             </a:fld>
             <a:endParaRPr lang="de-DE"/>
           </a:p>
@@ -3306,7 +3306,7 @@
           <a:p>
             <a:fld id="{A70FBE72-9C64-4629-A7AE-BA28906EEF36}" type="datetime1">
               <a:rPr lang="de-DE" smtClean="0"/>
-              <a:t>02.12.2015</a:t>
+              <a:t>03.12.2015</a:t>
             </a:fld>
             <a:endParaRPr lang="de-DE"/>
           </a:p>
@@ -3523,7 +3523,7 @@
           <a:p>
             <a:fld id="{B8694A38-0E3C-442D-AAEB-56DC96E76ED1}" type="datetime1">
               <a:rPr lang="de-DE" smtClean="0"/>
-              <a:t>02.12.2015</a:t>
+              <a:t>03.12.2015</a:t>
             </a:fld>
             <a:endParaRPr lang="de-DE"/>
           </a:p>
@@ -4024,7 +4024,7 @@
           <a:p>
             <a:fld id="{EBED332C-280D-4714-B46A-AF2A26724BB5}" type="datetime1">
               <a:rPr lang="de-DE" smtClean="0"/>
-              <a:t>02.12.2015</a:t>
+              <a:t>03.12.2015</a:t>
             </a:fld>
             <a:endParaRPr lang="de-DE"/>
           </a:p>
@@ -4114,11 +4114,7 @@
           <a:p>
             <a:r>
               <a:rPr lang="en-US" dirty="0" smtClean="0"/>
-              <a:t>After a few thousand examples the network learned the ‚concept‘ of handwritten </a:t>
-            </a:r>
-            <a:r>
-              <a:rPr lang="en-US" dirty="0" smtClean="0"/>
-              <a:t>digits</a:t>
+              <a:t>After a few thousand examples the network learned the ‚concept‘ of handwritten digits</a:t>
             </a:r>
           </a:p>
           <a:p>
@@ -4142,7 +4138,6 @@
               <a:rPr lang="en-US" dirty="0" smtClean="0"/>
               <a:t> results a set of data was left untouched</a:t>
             </a:r>
-            <a:endParaRPr lang="en-US" dirty="0" smtClean="0"/>
           </a:p>
           <a:p>
             <a:pPr marL="0" indent="0">
@@ -4215,7 +4210,7 @@
           <a:p>
             <a:fld id="{193CF126-A097-400B-B727-4E69EC9FD2FF}" type="datetime1">
               <a:rPr lang="de-DE" smtClean="0"/>
-              <a:t>02.12.2015</a:t>
+              <a:t>03.12.2015</a:t>
             </a:fld>
             <a:endParaRPr lang="de-DE"/>
           </a:p>
@@ -4662,7 +4657,7 @@
           <a:p>
             <a:fld id="{B56A4490-B7AE-49FE-BF90-01EEF811007E}" type="datetime1">
               <a:rPr lang="de-DE" smtClean="0"/>
-              <a:t>02.12.2015</a:t>
+              <a:t>03.12.2015</a:t>
             </a:fld>
             <a:endParaRPr lang="de-DE"/>
           </a:p>
@@ -6539,7 +6534,7 @@
           <a:p>
             <a:fld id="{352DD2C9-717D-490F-9BD5-D3BD266B093E}" type="datetime1">
               <a:rPr lang="de-DE" smtClean="0"/>
-              <a:t>02.12.2015</a:t>
+              <a:t>03.12.2015</a:t>
             </a:fld>
             <a:endParaRPr lang="de-DE"/>
           </a:p>
@@ -7337,7 +7332,7 @@
           <a:p>
             <a:fld id="{6F53AE32-8E32-4117-A722-EEF406437102}" type="datetime1">
               <a:rPr lang="de-DE" smtClean="0"/>
-              <a:t>02.12.2015</a:t>
+              <a:t>03.12.2015</a:t>
             </a:fld>
             <a:endParaRPr lang="de-DE"/>
           </a:p>
@@ -7448,7 +7443,99 @@
           <a:bodyPr/>
           <a:lstStyle/>
           <a:p>
-            <a:endParaRPr lang="en-US"/>
+            <a:r>
+              <a:rPr lang="de-DE" dirty="0" err="1" smtClean="0"/>
+              <a:t>Accuracy</a:t>
+            </a:r>
+            <a:r>
+              <a:rPr lang="de-DE" dirty="0" smtClean="0"/>
+              <a:t> </a:t>
+            </a:r>
+            <a:r>
+              <a:rPr lang="de-DE" dirty="0" err="1" smtClean="0"/>
+              <a:t>of</a:t>
+            </a:r>
+            <a:r>
+              <a:rPr lang="de-DE" dirty="0" smtClean="0"/>
+              <a:t> </a:t>
+            </a:r>
+            <a:r>
+              <a:rPr lang="de-DE" dirty="0" err="1" smtClean="0"/>
+              <a:t>classification</a:t>
+            </a:r>
+            <a:r>
+              <a:rPr lang="de-DE" dirty="0" smtClean="0"/>
+              <a:t>: 85.60 %</a:t>
+            </a:r>
+          </a:p>
+          <a:p>
+            <a:r>
+              <a:rPr lang="de-DE" dirty="0" err="1" smtClean="0"/>
+              <a:t>Rather</a:t>
+            </a:r>
+            <a:r>
+              <a:rPr lang="de-DE" dirty="0" smtClean="0"/>
+              <a:t> </a:t>
+            </a:r>
+            <a:r>
+              <a:rPr lang="de-DE" dirty="0" err="1" smtClean="0"/>
+              <a:t>bad</a:t>
+            </a:r>
+            <a:r>
+              <a:rPr lang="de-DE" dirty="0" smtClean="0"/>
+              <a:t>, </a:t>
+            </a:r>
+            <a:r>
+              <a:rPr lang="de-DE" dirty="0" err="1" smtClean="0"/>
+              <a:t>compared</a:t>
+            </a:r>
+            <a:r>
+              <a:rPr lang="de-DE" dirty="0" smtClean="0"/>
+              <a:t> </a:t>
+            </a:r>
+            <a:r>
+              <a:rPr lang="de-DE" dirty="0" err="1" smtClean="0"/>
+              <a:t>to</a:t>
+            </a:r>
+            <a:r>
+              <a:rPr lang="de-DE" dirty="0" smtClean="0"/>
+              <a:t> </a:t>
+            </a:r>
+            <a:r>
+              <a:rPr lang="de-DE" dirty="0" err="1" smtClean="0"/>
+              <a:t>other</a:t>
+            </a:r>
+            <a:r>
+              <a:rPr lang="de-DE" dirty="0" smtClean="0"/>
+              <a:t> </a:t>
+            </a:r>
+            <a:r>
+              <a:rPr lang="de-DE" dirty="0" err="1" smtClean="0"/>
+              <a:t>works</a:t>
+            </a:r>
+            <a:r>
+              <a:rPr lang="de-DE" dirty="0" smtClean="0"/>
+              <a:t> </a:t>
+            </a:r>
+            <a:r>
+              <a:rPr lang="de-DE" dirty="0" err="1" smtClean="0"/>
+              <a:t>with</a:t>
+            </a:r>
+            <a:r>
+              <a:rPr lang="de-DE" dirty="0" smtClean="0"/>
+              <a:t> MNIST </a:t>
+            </a:r>
+            <a:r>
+              <a:rPr lang="de-DE" dirty="0" err="1" smtClean="0"/>
+              <a:t>database</a:t>
+            </a:r>
+            <a:endParaRPr lang="de-DE" dirty="0" smtClean="0"/>
+          </a:p>
+          <a:p>
+            <a:pPr marL="0" indent="0">
+              <a:buNone/>
+            </a:pPr>
+            <a:endParaRPr lang="en-US" dirty="0"/>
           </a:p>
         </p:txBody>
       </p:sp>
@@ -7469,7 +7556,7 @@
           <a:p>
             <a:fld id="{B56A4490-B7AE-49FE-BF90-01EEF811007E}" type="datetime1">
               <a:rPr lang="de-DE" smtClean="0"/>
-              <a:t>02.12.2015</a:t>
+              <a:t>03.12.2015</a:t>
             </a:fld>
             <a:endParaRPr lang="de-DE"/>
           </a:p>
@@ -7518,6 +7605,943 @@
               <a:t>14</a:t>
             </a:fld>
             <a:endParaRPr lang="de-DE"/>
+          </a:p>
+        </p:txBody>
+      </p:sp>
+      <p:graphicFrame>
+        <p:nvGraphicFramePr>
+          <p:cNvPr id="7" name="Tabelle 6"/>
+          <p:cNvGraphicFramePr>
+            <a:graphicFrameLocks noGrp="1"/>
+          </p:cNvGraphicFramePr>
+          <p:nvPr>
+            <p:extLst>
+              <p:ext uri="{D42A27DB-BD31-4B8C-83A1-F6EECF244321}">
+                <p14:modId xmlns:p14="http://schemas.microsoft.com/office/powerpoint/2010/main" val="3652940534"/>
+              </p:ext>
+            </p:extLst>
+          </p:nvPr>
+        </p:nvGraphicFramePr>
+        <p:xfrm>
+          <a:off x="755576" y="3284984"/>
+          <a:ext cx="7632849" cy="2304255"/>
+        </p:xfrm>
+        <a:graphic>
+          <a:graphicData uri="http://schemas.openxmlformats.org/drawingml/2006/table">
+            <a:tbl>
+              <a:tblPr firstRow="1" bandRow="1">
+                <a:tableStyleId>{2D5ABB26-0587-4C30-8999-92F81FD0307C}</a:tableStyleId>
+              </a:tblPr>
+              <a:tblGrid>
+                <a:gridCol w="1296144"/>
+                <a:gridCol w="4752528"/>
+                <a:gridCol w="1584177"/>
+              </a:tblGrid>
+              <a:tr h="460851">
+                <a:tc>
+                  <a:txBody>
+                    <a:bodyPr/>
+                    <a:lstStyle/>
+                    <a:p>
+                      <a:pPr algn="l"/>
+                      <a:r>
+                        <a:rPr lang="de-DE" dirty="0" smtClean="0"/>
+                        <a:t>Reference</a:t>
+                      </a:r>
+                      <a:endParaRPr lang="en-US" dirty="0"/>
+                    </a:p>
+                  </a:txBody>
+                  <a:tcPr>
+                    <a:lnL w="12700" cap="flat" cmpd="sng" algn="ctr">
+                      <a:noFill/>
+                      <a:prstDash val="solid"/>
+                      <a:round/>
+                      <a:headEnd type="none" w="med" len="med"/>
+                      <a:tailEnd type="none" w="med" len="med"/>
+                    </a:lnL>
+                    <a:lnR w="12700" cap="flat" cmpd="sng" algn="ctr">
+                      <a:noFill/>
+                      <a:prstDash val="solid"/>
+                      <a:round/>
+                      <a:headEnd type="none" w="med" len="med"/>
+                      <a:tailEnd type="none" w="med" len="med"/>
+                    </a:lnR>
+                    <a:lnT w="12700" cap="flat" cmpd="sng" algn="ctr">
+                      <a:noFill/>
+                      <a:prstDash val="solid"/>
+                      <a:round/>
+                      <a:headEnd type="none" w="med" len="med"/>
+                      <a:tailEnd type="none" w="med" len="med"/>
+                    </a:lnT>
+                    <a:lnB w="12700" cap="flat" cmpd="sng" algn="ctr">
+                      <a:noFill/>
+                      <a:prstDash val="solid"/>
+                      <a:round/>
+                      <a:headEnd type="none" w="med" len="med"/>
+                      <a:tailEnd type="none" w="med" len="med"/>
+                    </a:lnB>
+                    <a:lnTlToBr w="12700" cmpd="sng">
+                      <a:noFill/>
+                      <a:prstDash val="solid"/>
+                    </a:lnTlToBr>
+                    <a:lnBlToTr w="12700" cmpd="sng">
+                      <a:noFill/>
+                      <a:prstDash val="solid"/>
+                    </a:lnBlToTr>
+                  </a:tcPr>
+                </a:tc>
+                <a:tc>
+                  <a:txBody>
+                    <a:bodyPr/>
+                    <a:lstStyle/>
+                    <a:p>
+                      <a:pPr algn="ctr"/>
+                      <a:r>
+                        <a:rPr lang="de-DE" dirty="0" err="1" smtClean="0"/>
+                        <a:t>Classifier</a:t>
+                      </a:r>
+                      <a:endParaRPr lang="en-US" dirty="0"/>
+                    </a:p>
+                  </a:txBody>
+                  <a:tcPr>
+                    <a:lnL w="12700" cap="flat" cmpd="sng" algn="ctr">
+                      <a:noFill/>
+                      <a:prstDash val="solid"/>
+                      <a:round/>
+                      <a:headEnd type="none" w="med" len="med"/>
+                      <a:tailEnd type="none" w="med" len="med"/>
+                    </a:lnL>
+                    <a:lnR w="12700" cap="flat" cmpd="sng" algn="ctr">
+                      <a:noFill/>
+                      <a:prstDash val="solid"/>
+                      <a:round/>
+                      <a:headEnd type="none" w="med" len="med"/>
+                      <a:tailEnd type="none" w="med" len="med"/>
+                    </a:lnR>
+                    <a:lnT w="12700" cap="flat" cmpd="sng" algn="ctr">
+                      <a:noFill/>
+                      <a:prstDash val="solid"/>
+                      <a:round/>
+                      <a:headEnd type="none" w="med" len="med"/>
+                      <a:tailEnd type="none" w="med" len="med"/>
+                    </a:lnT>
+                    <a:lnB w="12700" cap="flat" cmpd="sng" algn="ctr">
+                      <a:noFill/>
+                      <a:prstDash val="solid"/>
+                      <a:round/>
+                      <a:headEnd type="none" w="med" len="med"/>
+                      <a:tailEnd type="none" w="med" len="med"/>
+                    </a:lnB>
+                    <a:lnTlToBr w="12700" cmpd="sng">
+                      <a:noFill/>
+                      <a:prstDash val="solid"/>
+                    </a:lnTlToBr>
+                    <a:lnBlToTr w="12700" cmpd="sng">
+                      <a:noFill/>
+                      <a:prstDash val="solid"/>
+                    </a:lnBlToTr>
+                  </a:tcPr>
+                </a:tc>
+                <a:tc>
+                  <a:txBody>
+                    <a:bodyPr/>
+                    <a:lstStyle/>
+                    <a:p>
+                      <a:pPr algn="ctr"/>
+                      <a:r>
+                        <a:rPr lang="de-DE" dirty="0" err="1" smtClean="0"/>
+                        <a:t>Accuracy</a:t>
+                      </a:r>
+                      <a:endParaRPr lang="en-US" dirty="0"/>
+                    </a:p>
+                  </a:txBody>
+                  <a:tcPr>
+                    <a:lnL w="12700" cap="flat" cmpd="sng" algn="ctr">
+                      <a:noFill/>
+                      <a:prstDash val="solid"/>
+                      <a:round/>
+                      <a:headEnd type="none" w="med" len="med"/>
+                      <a:tailEnd type="none" w="med" len="med"/>
+                    </a:lnL>
+                    <a:lnR w="12700" cap="flat" cmpd="sng" algn="ctr">
+                      <a:noFill/>
+                      <a:prstDash val="solid"/>
+                      <a:round/>
+                      <a:headEnd type="none" w="med" len="med"/>
+                      <a:tailEnd type="none" w="med" len="med"/>
+                    </a:lnR>
+                    <a:lnT w="12700" cap="flat" cmpd="sng" algn="ctr">
+                      <a:noFill/>
+                      <a:prstDash val="solid"/>
+                      <a:round/>
+                      <a:headEnd type="none" w="med" len="med"/>
+                      <a:tailEnd type="none" w="med" len="med"/>
+                    </a:lnT>
+                    <a:lnB w="12700" cap="flat" cmpd="sng" algn="ctr">
+                      <a:noFill/>
+                      <a:prstDash val="solid"/>
+                      <a:round/>
+                      <a:headEnd type="none" w="med" len="med"/>
+                      <a:tailEnd type="none" w="med" len="med"/>
+                    </a:lnB>
+                    <a:lnTlToBr w="12700" cmpd="sng">
+                      <a:noFill/>
+                      <a:prstDash val="solid"/>
+                    </a:lnTlToBr>
+                    <a:lnBlToTr w="12700" cmpd="sng">
+                      <a:noFill/>
+                      <a:prstDash val="solid"/>
+                    </a:lnBlToTr>
+                  </a:tcPr>
+                </a:tc>
+              </a:tr>
+              <a:tr h="460851">
+                <a:tc>
+                  <a:txBody>
+                    <a:bodyPr/>
+                    <a:lstStyle/>
+                    <a:p>
+                      <a:pPr algn="ctr"/>
+                      <a:r>
+                        <a:rPr lang="de-DE" dirty="0" smtClean="0"/>
+                        <a:t>[9]</a:t>
+                      </a:r>
+                      <a:endParaRPr lang="en-US" dirty="0"/>
+                    </a:p>
+                  </a:txBody>
+                  <a:tcPr>
+                    <a:lnL w="12700" cap="flat" cmpd="sng" algn="ctr">
+                      <a:noFill/>
+                      <a:prstDash val="solid"/>
+                      <a:round/>
+                      <a:headEnd type="none" w="med" len="med"/>
+                      <a:tailEnd type="none" w="med" len="med"/>
+                    </a:lnL>
+                    <a:lnR w="12700" cap="flat" cmpd="sng" algn="ctr">
+                      <a:noFill/>
+                      <a:prstDash val="solid"/>
+                      <a:round/>
+                      <a:headEnd type="none" w="med" len="med"/>
+                      <a:tailEnd type="none" w="med" len="med"/>
+                    </a:lnR>
+                    <a:lnT w="12700" cap="flat" cmpd="sng" algn="ctr">
+                      <a:noFill/>
+                      <a:prstDash val="solid"/>
+                      <a:round/>
+                      <a:headEnd type="none" w="med" len="med"/>
+                      <a:tailEnd type="none" w="med" len="med"/>
+                    </a:lnT>
+                    <a:lnB w="12700" cap="flat" cmpd="sng" algn="ctr">
+                      <a:noFill/>
+                      <a:prstDash val="solid"/>
+                      <a:round/>
+                      <a:headEnd type="none" w="med" len="med"/>
+                      <a:tailEnd type="none" w="med" len="med"/>
+                    </a:lnB>
+                    <a:lnTlToBr w="12700" cmpd="sng">
+                      <a:noFill/>
+                      <a:prstDash val="solid"/>
+                    </a:lnTlToBr>
+                    <a:lnBlToTr w="12700" cmpd="sng">
+                      <a:noFill/>
+                      <a:prstDash val="solid"/>
+                    </a:lnBlToTr>
+                  </a:tcPr>
+                </a:tc>
+                <a:tc>
+                  <a:txBody>
+                    <a:bodyPr/>
+                    <a:lstStyle/>
+                    <a:p>
+                      <a:pPr algn="ctr"/>
+                      <a:r>
+                        <a:rPr lang="de-DE" dirty="0" smtClean="0"/>
+                        <a:t>Support </a:t>
+                      </a:r>
+                      <a:r>
+                        <a:rPr lang="de-DE" dirty="0" err="1" smtClean="0"/>
+                        <a:t>Vector</a:t>
+                      </a:r>
+                      <a:r>
+                        <a:rPr lang="de-DE" dirty="0" smtClean="0"/>
+                        <a:t> </a:t>
+                      </a:r>
+                      <a:r>
+                        <a:rPr lang="de-DE" dirty="0" err="1" smtClean="0"/>
+                        <a:t>Machine</a:t>
+                      </a:r>
+                      <a:endParaRPr lang="en-US" dirty="0"/>
+                    </a:p>
+                  </a:txBody>
+                  <a:tcPr>
+                    <a:lnL w="12700" cap="flat" cmpd="sng" algn="ctr">
+                      <a:noFill/>
+                      <a:prstDash val="solid"/>
+                      <a:round/>
+                      <a:headEnd type="none" w="med" len="med"/>
+                      <a:tailEnd type="none" w="med" len="med"/>
+                    </a:lnL>
+                    <a:lnR w="12700" cap="flat" cmpd="sng" algn="ctr">
+                      <a:noFill/>
+                      <a:prstDash val="solid"/>
+                      <a:round/>
+                      <a:headEnd type="none" w="med" len="med"/>
+                      <a:tailEnd type="none" w="med" len="med"/>
+                    </a:lnR>
+                    <a:lnT w="12700" cap="flat" cmpd="sng" algn="ctr">
+                      <a:noFill/>
+                      <a:prstDash val="solid"/>
+                      <a:round/>
+                      <a:headEnd type="none" w="med" len="med"/>
+                      <a:tailEnd type="none" w="med" len="med"/>
+                    </a:lnT>
+                    <a:lnB w="12700" cap="flat" cmpd="sng" algn="ctr">
+                      <a:noFill/>
+                      <a:prstDash val="solid"/>
+                      <a:round/>
+                      <a:headEnd type="none" w="med" len="med"/>
+                      <a:tailEnd type="none" w="med" len="med"/>
+                    </a:lnB>
+                    <a:lnTlToBr w="12700" cmpd="sng">
+                      <a:noFill/>
+                      <a:prstDash val="solid"/>
+                    </a:lnTlToBr>
+                    <a:lnBlToTr w="12700" cmpd="sng">
+                      <a:noFill/>
+                      <a:prstDash val="solid"/>
+                    </a:lnBlToTr>
+                  </a:tcPr>
+                </a:tc>
+                <a:tc>
+                  <a:txBody>
+                    <a:bodyPr/>
+                    <a:lstStyle/>
+                    <a:p>
+                      <a:pPr algn="ctr"/>
+                      <a:r>
+                        <a:rPr lang="de-DE" dirty="0" smtClean="0"/>
+                        <a:t>99.44%</a:t>
+                      </a:r>
+                      <a:endParaRPr lang="en-US" dirty="0"/>
+                    </a:p>
+                  </a:txBody>
+                  <a:tcPr>
+                    <a:lnL w="12700" cap="flat" cmpd="sng" algn="ctr">
+                      <a:noFill/>
+                      <a:prstDash val="solid"/>
+                      <a:round/>
+                      <a:headEnd type="none" w="med" len="med"/>
+                      <a:tailEnd type="none" w="med" len="med"/>
+                    </a:lnL>
+                    <a:lnR w="12700" cap="flat" cmpd="sng" algn="ctr">
+                      <a:noFill/>
+                      <a:prstDash val="solid"/>
+                      <a:round/>
+                      <a:headEnd type="none" w="med" len="med"/>
+                      <a:tailEnd type="none" w="med" len="med"/>
+                    </a:lnR>
+                    <a:lnT w="12700" cap="flat" cmpd="sng" algn="ctr">
+                      <a:noFill/>
+                      <a:prstDash val="solid"/>
+                      <a:round/>
+                      <a:headEnd type="none" w="med" len="med"/>
+                      <a:tailEnd type="none" w="med" len="med"/>
+                    </a:lnT>
+                    <a:lnB w="12700" cap="flat" cmpd="sng" algn="ctr">
+                      <a:noFill/>
+                      <a:prstDash val="solid"/>
+                      <a:round/>
+                      <a:headEnd type="none" w="med" len="med"/>
+                      <a:tailEnd type="none" w="med" len="med"/>
+                    </a:lnB>
+                    <a:lnTlToBr w="12700" cmpd="sng">
+                      <a:noFill/>
+                      <a:prstDash val="solid"/>
+                    </a:lnTlToBr>
+                    <a:lnBlToTr w="12700" cmpd="sng">
+                      <a:noFill/>
+                      <a:prstDash val="solid"/>
+                    </a:lnBlToTr>
+                  </a:tcPr>
+                </a:tc>
+              </a:tr>
+              <a:tr h="460851">
+                <a:tc>
+                  <a:txBody>
+                    <a:bodyPr/>
+                    <a:lstStyle/>
+                    <a:p>
+                      <a:pPr algn="ctr"/>
+                      <a:r>
+                        <a:rPr lang="de-DE" dirty="0" smtClean="0"/>
+                        <a:t>[10]</a:t>
+                      </a:r>
+                      <a:endParaRPr lang="en-US" dirty="0"/>
+                    </a:p>
+                  </a:txBody>
+                  <a:tcPr>
+                    <a:lnL w="12700" cap="flat" cmpd="sng" algn="ctr">
+                      <a:noFill/>
+                      <a:prstDash val="solid"/>
+                      <a:round/>
+                      <a:headEnd type="none" w="med" len="med"/>
+                      <a:tailEnd type="none" w="med" len="med"/>
+                    </a:lnL>
+                    <a:lnR w="12700" cap="flat" cmpd="sng" algn="ctr">
+                      <a:noFill/>
+                      <a:prstDash val="solid"/>
+                      <a:round/>
+                      <a:headEnd type="none" w="med" len="med"/>
+                      <a:tailEnd type="none" w="med" len="med"/>
+                    </a:lnR>
+                    <a:lnT w="12700" cap="flat" cmpd="sng" algn="ctr">
+                      <a:noFill/>
+                      <a:prstDash val="solid"/>
+                      <a:round/>
+                      <a:headEnd type="none" w="med" len="med"/>
+                      <a:tailEnd type="none" w="med" len="med"/>
+                    </a:lnT>
+                    <a:lnB w="12700" cap="flat" cmpd="sng" algn="ctr">
+                      <a:noFill/>
+                      <a:prstDash val="solid"/>
+                      <a:round/>
+                      <a:headEnd type="none" w="med" len="med"/>
+                      <a:tailEnd type="none" w="med" len="med"/>
+                    </a:lnB>
+                    <a:lnTlToBr w="12700" cmpd="sng">
+                      <a:noFill/>
+                      <a:prstDash val="solid"/>
+                    </a:lnTlToBr>
+                    <a:lnBlToTr w="12700" cmpd="sng">
+                      <a:noFill/>
+                      <a:prstDash val="solid"/>
+                    </a:lnBlToTr>
+                  </a:tcPr>
+                </a:tc>
+                <a:tc>
+                  <a:txBody>
+                    <a:bodyPr/>
+                    <a:lstStyle/>
+                    <a:p>
+                      <a:pPr algn="ctr"/>
+                      <a:r>
+                        <a:rPr lang="de-DE" dirty="0" err="1" smtClean="0"/>
+                        <a:t>Combination</a:t>
+                      </a:r>
+                      <a:r>
+                        <a:rPr lang="de-DE" dirty="0" smtClean="0"/>
+                        <a:t> </a:t>
+                      </a:r>
+                      <a:r>
+                        <a:rPr lang="de-DE" dirty="0" err="1" smtClean="0"/>
+                        <a:t>of</a:t>
+                      </a:r>
+                      <a:r>
+                        <a:rPr lang="de-DE" dirty="0" smtClean="0"/>
+                        <a:t> </a:t>
+                      </a:r>
+                      <a:r>
+                        <a:rPr lang="de-DE" dirty="0" err="1" smtClean="0"/>
+                        <a:t>convolutional</a:t>
+                      </a:r>
+                      <a:r>
+                        <a:rPr lang="de-DE" dirty="0" smtClean="0"/>
+                        <a:t> </a:t>
+                      </a:r>
+                      <a:r>
+                        <a:rPr lang="de-DE" dirty="0" err="1" smtClean="0"/>
+                        <a:t>Neural</a:t>
+                      </a:r>
+                      <a:r>
+                        <a:rPr lang="de-DE" dirty="0" smtClean="0"/>
+                        <a:t> Networks</a:t>
+                      </a:r>
+                      <a:endParaRPr lang="en-US" dirty="0"/>
+                    </a:p>
+                  </a:txBody>
+                  <a:tcPr>
+                    <a:lnL w="12700" cap="flat" cmpd="sng" algn="ctr">
+                      <a:noFill/>
+                      <a:prstDash val="solid"/>
+                      <a:round/>
+                      <a:headEnd type="none" w="med" len="med"/>
+                      <a:tailEnd type="none" w="med" len="med"/>
+                    </a:lnL>
+                    <a:lnR w="12700" cap="flat" cmpd="sng" algn="ctr">
+                      <a:noFill/>
+                      <a:prstDash val="solid"/>
+                      <a:round/>
+                      <a:headEnd type="none" w="med" len="med"/>
+                      <a:tailEnd type="none" w="med" len="med"/>
+                    </a:lnR>
+                    <a:lnT w="12700" cap="flat" cmpd="sng" algn="ctr">
+                      <a:noFill/>
+                      <a:prstDash val="solid"/>
+                      <a:round/>
+                      <a:headEnd type="none" w="med" len="med"/>
+                      <a:tailEnd type="none" w="med" len="med"/>
+                    </a:lnT>
+                    <a:lnB w="12700" cap="flat" cmpd="sng" algn="ctr">
+                      <a:noFill/>
+                      <a:prstDash val="solid"/>
+                      <a:round/>
+                      <a:headEnd type="none" w="med" len="med"/>
+                      <a:tailEnd type="none" w="med" len="med"/>
+                    </a:lnB>
+                    <a:lnTlToBr w="12700" cmpd="sng">
+                      <a:noFill/>
+                      <a:prstDash val="solid"/>
+                    </a:lnTlToBr>
+                    <a:lnBlToTr w="12700" cmpd="sng">
+                      <a:noFill/>
+                      <a:prstDash val="solid"/>
+                    </a:lnBlToTr>
+                  </a:tcPr>
+                </a:tc>
+                <a:tc>
+                  <a:txBody>
+                    <a:bodyPr/>
+                    <a:lstStyle/>
+                    <a:p>
+                      <a:pPr algn="ctr"/>
+                      <a:r>
+                        <a:rPr lang="de-DE" dirty="0" smtClean="0"/>
+                        <a:t>99.73%</a:t>
+                      </a:r>
+                      <a:endParaRPr lang="en-US" dirty="0"/>
+                    </a:p>
+                  </a:txBody>
+                  <a:tcPr>
+                    <a:lnL w="12700" cap="flat" cmpd="sng" algn="ctr">
+                      <a:noFill/>
+                      <a:prstDash val="solid"/>
+                      <a:round/>
+                      <a:headEnd type="none" w="med" len="med"/>
+                      <a:tailEnd type="none" w="med" len="med"/>
+                    </a:lnL>
+                    <a:lnR w="12700" cap="flat" cmpd="sng" algn="ctr">
+                      <a:noFill/>
+                      <a:prstDash val="solid"/>
+                      <a:round/>
+                      <a:headEnd type="none" w="med" len="med"/>
+                      <a:tailEnd type="none" w="med" len="med"/>
+                    </a:lnR>
+                    <a:lnT w="12700" cap="flat" cmpd="sng" algn="ctr">
+                      <a:noFill/>
+                      <a:prstDash val="solid"/>
+                      <a:round/>
+                      <a:headEnd type="none" w="med" len="med"/>
+                      <a:tailEnd type="none" w="med" len="med"/>
+                    </a:lnT>
+                    <a:lnB w="12700" cap="flat" cmpd="sng" algn="ctr">
+                      <a:noFill/>
+                      <a:prstDash val="solid"/>
+                      <a:round/>
+                      <a:headEnd type="none" w="med" len="med"/>
+                      <a:tailEnd type="none" w="med" len="med"/>
+                    </a:lnB>
+                    <a:lnTlToBr w="12700" cmpd="sng">
+                      <a:noFill/>
+                      <a:prstDash val="solid"/>
+                    </a:lnTlToBr>
+                    <a:lnBlToTr w="12700" cmpd="sng">
+                      <a:noFill/>
+                      <a:prstDash val="solid"/>
+                    </a:lnBlToTr>
+                  </a:tcPr>
+                </a:tc>
+              </a:tr>
+              <a:tr h="460851">
+                <a:tc>
+                  <a:txBody>
+                    <a:bodyPr/>
+                    <a:lstStyle/>
+                    <a:p>
+                      <a:pPr algn="ctr"/>
+                      <a:r>
+                        <a:rPr lang="de-DE" dirty="0" smtClean="0"/>
+                        <a:t>[11]</a:t>
+                      </a:r>
+                      <a:endParaRPr lang="en-US" dirty="0"/>
+                    </a:p>
+                  </a:txBody>
+                  <a:tcPr>
+                    <a:lnL w="12700" cap="flat" cmpd="sng" algn="ctr">
+                      <a:noFill/>
+                      <a:prstDash val="solid"/>
+                      <a:round/>
+                      <a:headEnd type="none" w="med" len="med"/>
+                      <a:tailEnd type="none" w="med" len="med"/>
+                    </a:lnL>
+                    <a:lnR w="12700" cap="flat" cmpd="sng" algn="ctr">
+                      <a:noFill/>
+                      <a:prstDash val="solid"/>
+                      <a:round/>
+                      <a:headEnd type="none" w="med" len="med"/>
+                      <a:tailEnd type="none" w="med" len="med"/>
+                    </a:lnR>
+                    <a:lnT w="12700" cap="flat" cmpd="sng" algn="ctr">
+                      <a:noFill/>
+                      <a:prstDash val="solid"/>
+                      <a:round/>
+                      <a:headEnd type="none" w="med" len="med"/>
+                      <a:tailEnd type="none" w="med" len="med"/>
+                    </a:lnT>
+                    <a:lnB w="12700" cap="flat" cmpd="sng" algn="ctr">
+                      <a:noFill/>
+                      <a:prstDash val="solid"/>
+                      <a:round/>
+                      <a:headEnd type="none" w="med" len="med"/>
+                      <a:tailEnd type="none" w="med" len="med"/>
+                    </a:lnB>
+                    <a:lnTlToBr w="12700" cmpd="sng">
+                      <a:noFill/>
+                      <a:prstDash val="solid"/>
+                    </a:lnTlToBr>
+                    <a:lnBlToTr w="12700" cmpd="sng">
+                      <a:noFill/>
+                      <a:prstDash val="solid"/>
+                    </a:lnBlToTr>
+                  </a:tcPr>
+                </a:tc>
+                <a:tc>
+                  <a:txBody>
+                    <a:bodyPr/>
+                    <a:lstStyle/>
+                    <a:p>
+                      <a:pPr marL="0" marR="0" indent="0" algn="ctr" defTabSz="914400" rtl="0" eaLnBrk="1" fontAlgn="auto" latinLnBrk="0" hangingPunct="1">
+                        <a:lnSpc>
+                          <a:spcPct val="100000"/>
+                        </a:lnSpc>
+                        <a:spcBef>
+                          <a:spcPts val="0"/>
+                        </a:spcBef>
+                        <a:spcAft>
+                          <a:spcPts val="0"/>
+                        </a:spcAft>
+                        <a:buClrTx/>
+                        <a:buSzTx/>
+                        <a:buFontTx/>
+                        <a:buNone/>
+                        <a:tabLst/>
+                        <a:defRPr/>
+                      </a:pPr>
+                      <a:r>
+                        <a:rPr lang="de-DE" dirty="0" err="1" smtClean="0"/>
+                        <a:t>Combination</a:t>
+                      </a:r>
+                      <a:r>
+                        <a:rPr lang="de-DE" dirty="0" smtClean="0"/>
+                        <a:t> </a:t>
+                      </a:r>
+                      <a:r>
+                        <a:rPr lang="de-DE" dirty="0" err="1" smtClean="0"/>
+                        <a:t>of</a:t>
+                      </a:r>
+                      <a:r>
+                        <a:rPr lang="de-DE" dirty="0" smtClean="0"/>
+                        <a:t> </a:t>
+                      </a:r>
+                      <a:r>
+                        <a:rPr lang="de-DE" dirty="0" err="1" smtClean="0"/>
+                        <a:t>convolutional</a:t>
+                      </a:r>
+                      <a:r>
+                        <a:rPr lang="de-DE" dirty="0" smtClean="0"/>
+                        <a:t> </a:t>
+                      </a:r>
+                      <a:r>
+                        <a:rPr lang="de-DE" dirty="0" err="1" smtClean="0"/>
+                        <a:t>Neural</a:t>
+                      </a:r>
+                      <a:r>
+                        <a:rPr lang="de-DE" dirty="0" smtClean="0"/>
+                        <a:t> Networks</a:t>
+                      </a:r>
+                      <a:endParaRPr lang="en-US" dirty="0" smtClean="0"/>
+                    </a:p>
+                  </a:txBody>
+                  <a:tcPr>
+                    <a:lnL w="12700" cap="flat" cmpd="sng" algn="ctr">
+                      <a:noFill/>
+                      <a:prstDash val="solid"/>
+                      <a:round/>
+                      <a:headEnd type="none" w="med" len="med"/>
+                      <a:tailEnd type="none" w="med" len="med"/>
+                    </a:lnL>
+                    <a:lnR w="12700" cap="flat" cmpd="sng" algn="ctr">
+                      <a:noFill/>
+                      <a:prstDash val="solid"/>
+                      <a:round/>
+                      <a:headEnd type="none" w="med" len="med"/>
+                      <a:tailEnd type="none" w="med" len="med"/>
+                    </a:lnR>
+                    <a:lnT w="12700" cap="flat" cmpd="sng" algn="ctr">
+                      <a:noFill/>
+                      <a:prstDash val="solid"/>
+                      <a:round/>
+                      <a:headEnd type="none" w="med" len="med"/>
+                      <a:tailEnd type="none" w="med" len="med"/>
+                    </a:lnT>
+                    <a:lnB w="12700" cap="flat" cmpd="sng" algn="ctr">
+                      <a:noFill/>
+                      <a:prstDash val="solid"/>
+                      <a:round/>
+                      <a:headEnd type="none" w="med" len="med"/>
+                      <a:tailEnd type="none" w="med" len="med"/>
+                    </a:lnB>
+                    <a:lnTlToBr w="12700" cmpd="sng">
+                      <a:noFill/>
+                      <a:prstDash val="solid"/>
+                    </a:lnTlToBr>
+                    <a:lnBlToTr w="12700" cmpd="sng">
+                      <a:noFill/>
+                      <a:prstDash val="solid"/>
+                    </a:lnBlToTr>
+                  </a:tcPr>
+                </a:tc>
+                <a:tc>
+                  <a:txBody>
+                    <a:bodyPr/>
+                    <a:lstStyle/>
+                    <a:p>
+                      <a:pPr algn="ctr"/>
+                      <a:r>
+                        <a:rPr lang="de-DE" dirty="0" smtClean="0"/>
+                        <a:t>99.77%</a:t>
+                      </a:r>
+                      <a:endParaRPr lang="en-US" dirty="0"/>
+                    </a:p>
+                  </a:txBody>
+                  <a:tcPr>
+                    <a:lnL w="12700" cap="flat" cmpd="sng" algn="ctr">
+                      <a:noFill/>
+                      <a:prstDash val="solid"/>
+                      <a:round/>
+                      <a:headEnd type="none" w="med" len="med"/>
+                      <a:tailEnd type="none" w="med" len="med"/>
+                    </a:lnL>
+                    <a:lnR w="12700" cap="flat" cmpd="sng" algn="ctr">
+                      <a:noFill/>
+                      <a:prstDash val="solid"/>
+                      <a:round/>
+                      <a:headEnd type="none" w="med" len="med"/>
+                      <a:tailEnd type="none" w="med" len="med"/>
+                    </a:lnR>
+                    <a:lnT w="12700" cap="flat" cmpd="sng" algn="ctr">
+                      <a:noFill/>
+                      <a:prstDash val="solid"/>
+                      <a:round/>
+                      <a:headEnd type="none" w="med" len="med"/>
+                      <a:tailEnd type="none" w="med" len="med"/>
+                    </a:lnT>
+                    <a:lnB w="12700" cap="flat" cmpd="sng" algn="ctr">
+                      <a:noFill/>
+                      <a:prstDash val="solid"/>
+                      <a:round/>
+                      <a:headEnd type="none" w="med" len="med"/>
+                      <a:tailEnd type="none" w="med" len="med"/>
+                    </a:lnB>
+                    <a:lnTlToBr w="12700" cmpd="sng">
+                      <a:noFill/>
+                      <a:prstDash val="solid"/>
+                    </a:lnTlToBr>
+                    <a:lnBlToTr w="12700" cmpd="sng">
+                      <a:noFill/>
+                      <a:prstDash val="solid"/>
+                    </a:lnBlToTr>
+                  </a:tcPr>
+                </a:tc>
+              </a:tr>
+              <a:tr h="460851">
+                <a:tc>
+                  <a:txBody>
+                    <a:bodyPr/>
+                    <a:lstStyle/>
+                    <a:p>
+                      <a:pPr algn="ctr"/>
+                      <a:r>
+                        <a:rPr lang="de-DE" dirty="0" smtClean="0"/>
+                        <a:t>[12]</a:t>
+                      </a:r>
+                      <a:endParaRPr lang="en-US" dirty="0"/>
+                    </a:p>
+                  </a:txBody>
+                  <a:tcPr>
+                    <a:lnL w="12700" cap="flat" cmpd="sng" algn="ctr">
+                      <a:noFill/>
+                      <a:prstDash val="solid"/>
+                      <a:round/>
+                      <a:headEnd type="none" w="med" len="med"/>
+                      <a:tailEnd type="none" w="med" len="med"/>
+                    </a:lnL>
+                    <a:lnR w="12700" cap="flat" cmpd="sng" algn="ctr">
+                      <a:noFill/>
+                      <a:prstDash val="solid"/>
+                      <a:round/>
+                      <a:headEnd type="none" w="med" len="med"/>
+                      <a:tailEnd type="none" w="med" len="med"/>
+                    </a:lnR>
+                    <a:lnT w="12700" cap="flat" cmpd="sng" algn="ctr">
+                      <a:noFill/>
+                      <a:prstDash val="solid"/>
+                      <a:round/>
+                      <a:headEnd type="none" w="med" len="med"/>
+                      <a:tailEnd type="none" w="med" len="med"/>
+                    </a:lnT>
+                    <a:lnB w="12700" cap="flat" cmpd="sng" algn="ctr">
+                      <a:noFill/>
+                      <a:prstDash val="solid"/>
+                      <a:round/>
+                      <a:headEnd type="none" w="med" len="med"/>
+                      <a:tailEnd type="none" w="med" len="med"/>
+                    </a:lnB>
+                    <a:lnTlToBr w="12700" cmpd="sng">
+                      <a:noFill/>
+                      <a:prstDash val="solid"/>
+                    </a:lnTlToBr>
+                    <a:lnBlToTr w="12700" cmpd="sng">
+                      <a:noFill/>
+                      <a:prstDash val="solid"/>
+                    </a:lnBlToTr>
+                  </a:tcPr>
+                </a:tc>
+                <a:tc>
+                  <a:txBody>
+                    <a:bodyPr/>
+                    <a:lstStyle/>
+                    <a:p>
+                      <a:pPr algn="ctr"/>
+                      <a:r>
+                        <a:rPr lang="de-DE" dirty="0" err="1" smtClean="0"/>
+                        <a:t>Perceptron</a:t>
+                      </a:r>
+                      <a:endParaRPr lang="en-US" dirty="0"/>
+                    </a:p>
+                  </a:txBody>
+                  <a:tcPr>
+                    <a:lnL w="12700" cap="flat" cmpd="sng" algn="ctr">
+                      <a:noFill/>
+                      <a:prstDash val="solid"/>
+                      <a:round/>
+                      <a:headEnd type="none" w="med" len="med"/>
+                      <a:tailEnd type="none" w="med" len="med"/>
+                    </a:lnL>
+                    <a:lnR w="12700" cap="flat" cmpd="sng" algn="ctr">
+                      <a:noFill/>
+                      <a:prstDash val="solid"/>
+                      <a:round/>
+                      <a:headEnd type="none" w="med" len="med"/>
+                      <a:tailEnd type="none" w="med" len="med"/>
+                    </a:lnR>
+                    <a:lnT w="12700" cap="flat" cmpd="sng" algn="ctr">
+                      <a:noFill/>
+                      <a:prstDash val="solid"/>
+                      <a:round/>
+                      <a:headEnd type="none" w="med" len="med"/>
+                      <a:tailEnd type="none" w="med" len="med"/>
+                    </a:lnT>
+                    <a:lnB w="12700" cap="flat" cmpd="sng" algn="ctr">
+                      <a:noFill/>
+                      <a:prstDash val="solid"/>
+                      <a:round/>
+                      <a:headEnd type="none" w="med" len="med"/>
+                      <a:tailEnd type="none" w="med" len="med"/>
+                    </a:lnB>
+                    <a:lnTlToBr w="12700" cmpd="sng">
+                      <a:noFill/>
+                      <a:prstDash val="solid"/>
+                    </a:lnTlToBr>
+                    <a:lnBlToTr w="12700" cmpd="sng">
+                      <a:noFill/>
+                      <a:prstDash val="solid"/>
+                    </a:lnBlToTr>
+                  </a:tcPr>
+                </a:tc>
+                <a:tc>
+                  <a:txBody>
+                    <a:bodyPr/>
+                    <a:lstStyle/>
+                    <a:p>
+                      <a:pPr algn="ctr"/>
+                      <a:r>
+                        <a:rPr lang="de-DE" dirty="0" smtClean="0"/>
+                        <a:t>99.37%</a:t>
+                      </a:r>
+                      <a:endParaRPr lang="en-US" dirty="0"/>
+                    </a:p>
+                  </a:txBody>
+                  <a:tcPr>
+                    <a:lnL w="12700" cap="flat" cmpd="sng" algn="ctr">
+                      <a:noFill/>
+                      <a:prstDash val="solid"/>
+                      <a:round/>
+                      <a:headEnd type="none" w="med" len="med"/>
+                      <a:tailEnd type="none" w="med" len="med"/>
+                    </a:lnL>
+                    <a:lnR w="12700" cap="flat" cmpd="sng" algn="ctr">
+                      <a:noFill/>
+                      <a:prstDash val="solid"/>
+                      <a:round/>
+                      <a:headEnd type="none" w="med" len="med"/>
+                      <a:tailEnd type="none" w="med" len="med"/>
+                    </a:lnR>
+                    <a:lnT w="12700" cap="flat" cmpd="sng" algn="ctr">
+                      <a:noFill/>
+                      <a:prstDash val="solid"/>
+                      <a:round/>
+                      <a:headEnd type="none" w="med" len="med"/>
+                      <a:tailEnd type="none" w="med" len="med"/>
+                    </a:lnT>
+                    <a:lnB w="12700" cap="flat" cmpd="sng" algn="ctr">
+                      <a:noFill/>
+                      <a:prstDash val="solid"/>
+                      <a:round/>
+                      <a:headEnd type="none" w="med" len="med"/>
+                      <a:tailEnd type="none" w="med" len="med"/>
+                    </a:lnB>
+                    <a:lnTlToBr w="12700" cmpd="sng">
+                      <a:noFill/>
+                      <a:prstDash val="solid"/>
+                    </a:lnTlToBr>
+                    <a:lnBlToTr w="12700" cmpd="sng">
+                      <a:noFill/>
+                      <a:prstDash val="solid"/>
+                    </a:lnBlToTr>
+                  </a:tcPr>
+                </a:tc>
+              </a:tr>
+            </a:tbl>
+          </a:graphicData>
+        </a:graphic>
+      </p:graphicFrame>
+      <p:sp>
+        <p:nvSpPr>
+          <p:cNvPr id="8" name="Textfeld 7"/>
+          <p:cNvSpPr txBox="1"/>
+          <p:nvPr/>
+        </p:nvSpPr>
+        <p:spPr>
+          <a:xfrm>
+            <a:off x="755576" y="5671082"/>
+            <a:ext cx="7632848" cy="338554"/>
+          </a:xfrm>
+          <a:prstGeom prst="rect">
+            <a:avLst/>
+          </a:prstGeom>
+          <a:noFill/>
+        </p:spPr>
+        <p:txBody>
+          <a:bodyPr wrap="square" rtlCol="0">
+            <a:spAutoFit/>
+          </a:bodyPr>
+          <a:lstStyle/>
+          <a:p>
+            <a:r>
+              <a:rPr lang="en-US" sz="1600" dirty="0" smtClean="0"/>
+              <a:t>[8]</a:t>
+            </a:r>
+            <a:endParaRPr lang="en-US" sz="1600" dirty="0"/>
           </a:p>
         </p:txBody>
       </p:sp>
@@ -7587,7 +8611,7 @@
         <p:spPr/>
         <p:txBody>
           <a:bodyPr>
-            <a:normAutofit/>
+            <a:normAutofit fontScale="92500" lnSpcReduction="20000"/>
           </a:bodyPr>
           <a:lstStyle/>
           <a:p>
@@ -7748,8 +8772,247 @@
             </a:r>
             <a:r>
               <a:rPr lang="de-DE" sz="1600" dirty="0" smtClean="0"/>
-              <a:t> Learning, McGraw Hill, ISBN 0-07-115467-1</a:t>
-            </a:r>
+              <a:t> Learning, McGraw Hill, ISBN </a:t>
+            </a:r>
+            <a:r>
+              <a:rPr lang="de-DE" sz="1600" dirty="0" smtClean="0"/>
+              <a:t>0-07-115467-1</a:t>
+            </a:r>
+          </a:p>
+          <a:p>
+            <a:pPr marL="0" indent="0">
+              <a:buNone/>
+            </a:pPr>
+            <a:r>
+              <a:rPr lang="de-DE" sz="1600" dirty="0" smtClean="0"/>
+              <a:t>[8] Mendes, </a:t>
+            </a:r>
+            <a:r>
+              <a:rPr lang="de-DE" sz="1600" dirty="0" err="1" smtClean="0"/>
+              <a:t>Filho</a:t>
+            </a:r>
+            <a:r>
+              <a:rPr lang="de-DE" sz="1600" dirty="0" smtClean="0"/>
+              <a:t>, Costa: </a:t>
+            </a:r>
+            <a:r>
+              <a:rPr lang="en-US" sz="1600" dirty="0"/>
+              <a:t>Handwritten Digit Recognition Using SVM Binary</a:t>
+            </a:r>
+            <a:br>
+              <a:rPr lang="en-US" sz="1600" dirty="0"/>
+            </a:br>
+            <a:r>
+              <a:rPr lang="en-US" sz="1600" dirty="0"/>
+              <a:t>Classifiers and Unbalanced Decision </a:t>
+            </a:r>
+            <a:r>
+              <a:rPr lang="en-US" sz="1600" dirty="0" smtClean="0"/>
+              <a:t>Trees, </a:t>
+            </a:r>
+            <a:r>
+              <a:rPr lang="en-US" sz="1600" dirty="0"/>
+              <a:t>Springer International Publishing Switzerland </a:t>
+            </a:r>
+            <a:r>
+              <a:rPr lang="en-US" sz="1600" dirty="0" smtClean="0"/>
+              <a:t>2014; Brazil</a:t>
+            </a:r>
+            <a:endParaRPr lang="de-DE" sz="1600" dirty="0" smtClean="0"/>
+          </a:p>
+          <a:p>
+            <a:pPr marL="0" indent="0">
+              <a:buNone/>
+            </a:pPr>
+            <a:r>
+              <a:rPr lang="de-DE" sz="1600" dirty="0" smtClean="0"/>
+              <a:t>[9]</a:t>
+            </a:r>
+            <a:r>
+              <a:rPr lang="en-US" sz="1600" dirty="0"/>
+              <a:t> </a:t>
+            </a:r>
+            <a:r>
+              <a:rPr lang="en-US" sz="1600" dirty="0" err="1"/>
+              <a:t>Decoste</a:t>
+            </a:r>
+            <a:r>
+              <a:rPr lang="en-US" sz="1600" dirty="0"/>
+              <a:t>, D., </a:t>
+            </a:r>
+            <a:r>
+              <a:rPr lang="en-US" sz="1600" dirty="0" err="1"/>
+              <a:t>Schölkopf</a:t>
+            </a:r>
+            <a:r>
+              <a:rPr lang="en-US" sz="1600" dirty="0"/>
+              <a:t>, B.: Training Invariant Support Vector Machines. Kluwer</a:t>
+            </a:r>
+            <a:br>
+              <a:rPr lang="en-US" sz="1600" dirty="0"/>
+            </a:br>
+            <a:r>
+              <a:rPr lang="en-US" sz="1600" dirty="0"/>
+              <a:t>Academic Publishers, The Netherlands (2002)</a:t>
+            </a:r>
+            <a:br>
+              <a:rPr lang="en-US" sz="1600" dirty="0"/>
+            </a:br>
+            <a:r>
+              <a:rPr lang="en-US" sz="1600" dirty="0" smtClean="0"/>
+              <a:t>[10]</a:t>
+            </a:r>
+            <a:r>
+              <a:rPr lang="en-US" sz="1600" dirty="0"/>
+              <a:t> </a:t>
+            </a:r>
+            <a:r>
+              <a:rPr lang="en-US" sz="1600" dirty="0" err="1"/>
+              <a:t>Ciresan</a:t>
+            </a:r>
+            <a:r>
+              <a:rPr lang="en-US" sz="1600" dirty="0"/>
+              <a:t>, D.C., Meier, U., Gambardella, L.M., </a:t>
+            </a:r>
+            <a:r>
+              <a:rPr lang="en-US" sz="1600" dirty="0" err="1"/>
+              <a:t>Schmidhuber</a:t>
+            </a:r>
+            <a:r>
+              <a:rPr lang="en-US" sz="1600" dirty="0"/>
+              <a:t>, J.: Convolutional Neural</a:t>
+            </a:r>
+            <a:br>
+              <a:rPr lang="en-US" sz="1600" dirty="0"/>
+            </a:br>
+            <a:r>
+              <a:rPr lang="en-US" sz="1600" dirty="0"/>
+              <a:t>Network Committees for Handwritten Character Classification. In: International</a:t>
+            </a:r>
+            <a:br>
+              <a:rPr lang="en-US" sz="1600" dirty="0"/>
+            </a:br>
+            <a:r>
+              <a:rPr lang="en-US" sz="1600" dirty="0"/>
+              <a:t>Conference on Document Analysis and Recognition (ICDAR), pp. 1135 –1139 (2011</a:t>
+            </a:r>
+            <a:r>
+              <a:rPr lang="en-US" sz="1600" dirty="0" smtClean="0"/>
+              <a:t>)</a:t>
+            </a:r>
+          </a:p>
+          <a:p>
+            <a:pPr marL="0" indent="0">
+              <a:buNone/>
+            </a:pPr>
+            <a:r>
+              <a:rPr lang="en-US" sz="1600" dirty="0" smtClean="0"/>
+              <a:t>[11] </a:t>
+            </a:r>
+            <a:r>
+              <a:rPr lang="en-US" sz="1600" dirty="0" err="1"/>
+              <a:t>Ciresan</a:t>
+            </a:r>
+            <a:r>
+              <a:rPr lang="en-US" sz="1600" dirty="0"/>
+              <a:t>, D., Meier, U., </a:t>
+            </a:r>
+            <a:r>
+              <a:rPr lang="en-US" sz="1600" dirty="0" err="1"/>
+              <a:t>Schmidhuber</a:t>
+            </a:r>
+            <a:r>
+              <a:rPr lang="en-US" sz="1600" dirty="0"/>
+              <a:t>, J.: Multi-column Deep Neural Networks for Image</a:t>
+            </a:r>
+            <a:br>
+              <a:rPr lang="en-US" sz="1600" dirty="0"/>
+            </a:br>
+            <a:r>
+              <a:rPr lang="en-US" sz="1600" dirty="0"/>
+              <a:t>Classification. </a:t>
+            </a:r>
+            <a:r>
+              <a:rPr lang="en-US" sz="1600" dirty="0" err="1"/>
+              <a:t>Dalle</a:t>
+            </a:r>
+            <a:r>
+              <a:rPr lang="en-US" sz="1600" dirty="0"/>
+              <a:t> </a:t>
+            </a:r>
+            <a:r>
+              <a:rPr lang="en-US" sz="1600" dirty="0" err="1"/>
+              <a:t>Molle</a:t>
+            </a:r>
+            <a:r>
+              <a:rPr lang="en-US" sz="1600" dirty="0"/>
+              <a:t> Institute for Artificial Intelligence. IDSIA/USI-SUPSI, </a:t>
+            </a:r>
+            <a:r>
+              <a:rPr lang="en-US" sz="1600" dirty="0" err="1"/>
+              <a:t>Manno</a:t>
+            </a:r>
+            <a:r>
+              <a:rPr lang="en-US" sz="1600" dirty="0"/>
+              <a:t>,</a:t>
+            </a:r>
+            <a:br>
+              <a:rPr lang="en-US" sz="1600" dirty="0"/>
+            </a:br>
+            <a:r>
+              <a:rPr lang="en-US" sz="1600" dirty="0"/>
+              <a:t>Switzerland (2012)</a:t>
+            </a:r>
+            <a:br>
+              <a:rPr lang="en-US" sz="1600" dirty="0"/>
+            </a:br>
+            <a:r>
+              <a:rPr lang="en-US" sz="1600" dirty="0" smtClean="0"/>
+              <a:t>[12]</a:t>
+            </a:r>
+            <a:r>
+              <a:rPr lang="en-US" sz="1600" dirty="0"/>
+              <a:t> </a:t>
+            </a:r>
+            <a:r>
+              <a:rPr lang="en-US" sz="1600" dirty="0" smtClean="0"/>
+              <a:t> </a:t>
+            </a:r>
+            <a:r>
+              <a:rPr lang="en-US" sz="1600" dirty="0" err="1" smtClean="0"/>
+              <a:t>Kussul</a:t>
+            </a:r>
+            <a:r>
+              <a:rPr lang="en-US" sz="1600" dirty="0"/>
+              <a:t>, E., </a:t>
+            </a:r>
+            <a:r>
+              <a:rPr lang="en-US" sz="1600" dirty="0" err="1"/>
+              <a:t>Baidyk</a:t>
+            </a:r>
+            <a:r>
+              <a:rPr lang="en-US" sz="1600" dirty="0"/>
+              <a:t>, T.: Improved method of handwritten digit recognition tested on</a:t>
+            </a:r>
+            <a:br>
+              <a:rPr lang="en-US" sz="1600" dirty="0"/>
+            </a:br>
+            <a:r>
+              <a:rPr lang="en-US" sz="1600" dirty="0"/>
+              <a:t>MNIST database. In: 15th International Conference on Vision Interface, vol. 22,</a:t>
+            </a:r>
+            <a:br>
+              <a:rPr lang="en-US" sz="1600" dirty="0"/>
+            </a:br>
+            <a:r>
+              <a:rPr lang="en-US" sz="1600" dirty="0"/>
+              <a:t>pp. 971–981 (2004</a:t>
+            </a:r>
+            <a:r>
+              <a:rPr lang="en-US" sz="1600" dirty="0" smtClean="0"/>
+              <a:t>)</a:t>
+            </a:r>
+            <a:endParaRPr lang="de-DE" sz="1600" dirty="0" smtClean="0"/>
           </a:p>
           <a:p>
             <a:pPr marL="0" indent="0">
@@ -7822,7 +9085,7 @@
           <a:p>
             <a:fld id="{697739FD-7709-4262-A18C-B879DC47FF22}" type="datetime1">
               <a:rPr lang="de-DE" smtClean="0"/>
-              <a:t>02.12.2015</a:t>
+              <a:t>03.12.2015</a:t>
             </a:fld>
             <a:endParaRPr lang="de-DE"/>
           </a:p>
@@ -8414,7 +9677,7 @@
           <a:p>
             <a:fld id="{EA7153EE-6B44-4F23-B163-647C61B0968F}" type="datetime1">
               <a:rPr lang="de-DE" smtClean="0"/>
-              <a:t>02.12.2015</a:t>
+              <a:t>03.12.2015</a:t>
             </a:fld>
             <a:endParaRPr lang="de-DE"/>
           </a:p>
@@ -8813,11 +10076,7 @@
           <a:p>
             <a:r>
               <a:rPr lang="en-US" dirty="0" smtClean="0"/>
-              <a:t>Basic </a:t>
-            </a:r>
-            <a:r>
-              <a:rPr lang="en-US" dirty="0" smtClean="0"/>
-              <a:t>Approach: Using Image processing for detection of special features: edges, corners, angles, etc.</a:t>
+              <a:t>Basic Approach: Using Image processing for detection of special features: edges, corners, angles, etc.</a:t>
             </a:r>
           </a:p>
           <a:p>
@@ -9268,7 +10527,7 @@
           <a:p>
             <a:fld id="{55A490F6-D2E0-4DD1-AEF5-E7C760D4630E}" type="datetime1">
               <a:rPr lang="de-DE" smtClean="0"/>
-              <a:t>02.12.2015</a:t>
+              <a:t>03.12.2015</a:t>
             </a:fld>
             <a:endParaRPr lang="de-DE"/>
           </a:p>
@@ -9356,15 +10615,7 @@
           <a:p>
             <a:r>
               <a:rPr lang="en-US" dirty="0" smtClean="0"/>
-              <a:t>There are mor</a:t>
-            </a:r>
-            <a:r>
-              <a:rPr lang="en-US" dirty="0" smtClean="0"/>
-              <a:t>e unusual types of handwriting</a:t>
-            </a:r>
-            <a:r>
-              <a:rPr lang="en-US" dirty="0" smtClean="0"/>
-              <a:t>:</a:t>
+              <a:t>There are more unusual types of handwriting:</a:t>
             </a:r>
             <a:endParaRPr lang="en-US" dirty="0"/>
           </a:p>
@@ -9890,19 +11141,7 @@
           <a:p>
             <a:r>
               <a:rPr lang="en-US" sz="2400" dirty="0" smtClean="0"/>
-              <a:t>It‘s very difficult (you might </a:t>
-            </a:r>
-            <a:r>
-              <a:rPr lang="en-US" sz="2400" dirty="0" smtClean="0"/>
-              <a:t>say </a:t>
-            </a:r>
-            <a:r>
-              <a:rPr lang="en-US" sz="2400" dirty="0" smtClean="0"/>
-              <a:t>impossible) to create a set of rules, which define the concept of a </a:t>
-            </a:r>
-            <a:r>
-              <a:rPr lang="en-US" sz="2400" dirty="0" smtClean="0"/>
-              <a:t>digit, e.g. a ‘5’</a:t>
+              <a:t>It‘s very difficult (you might say impossible) to create a set of rules, which define the concept of a digit, e.g. a ‘5’</a:t>
             </a:r>
             <a:endParaRPr lang="en-US" sz="2400" dirty="0"/>
           </a:p>
@@ -9925,7 +11164,7 @@
           <a:p>
             <a:fld id="{DA4918F3-BE4A-45A8-85BB-FED52A9F6A31}" type="datetime1">
               <a:rPr lang="de-DE" smtClean="0"/>
-              <a:t>02.12.2015</a:t>
+              <a:t>03.12.2015</a:t>
             </a:fld>
             <a:endParaRPr lang="de-DE"/>
           </a:p>
@@ -10015,11 +11254,7 @@
             </a:br>
             <a:r>
               <a:rPr lang="en-US" dirty="0" smtClean="0"/>
-              <a:t>A Multilayer</a:t>
-            </a:r>
-            <a:r>
-              <a:rPr lang="en-US" dirty="0" smtClean="0"/>
-              <a:t>-</a:t>
+              <a:t>A Multilayer-</a:t>
             </a:r>
             <a:r>
               <a:rPr lang="en-US" dirty="0" err="1" smtClean="0"/>
@@ -10027,11 +11262,7 @@
             </a:r>
             <a:r>
               <a:rPr lang="en-US" dirty="0" smtClean="0"/>
-              <a:t> </a:t>
-            </a:r>
-            <a:r>
-              <a:rPr lang="en-US" dirty="0" smtClean="0"/>
-              <a:t>Neural Network</a:t>
+              <a:t> Neural Network</a:t>
             </a:r>
             <a:endParaRPr lang="en-US" dirty="0"/>
           </a:p>
@@ -10100,7 +11331,7 @@
           <a:p>
             <a:fld id="{23DBC32B-27B8-43E2-BB0E-AFA4F61A529F}" type="datetime1">
               <a:rPr lang="de-DE" smtClean="0"/>
-              <a:t>02.12.2015</a:t>
+              <a:t>03.12.2015</a:t>
             </a:fld>
             <a:endParaRPr lang="de-DE"/>
           </a:p>
@@ -10233,25 +11464,13 @@
           <a:p>
             <a:r>
               <a:rPr lang="en-US" dirty="0" smtClean="0"/>
-              <a:t>A number of inputs, each </a:t>
-            </a:r>
+              <a:t>A number of inputs, each multiplied with a special weight, are added up in the neuron</a:t>
+            </a:r>
+          </a:p>
+          <a:p>
             <a:r>
               <a:rPr lang="en-US" dirty="0" smtClean="0"/>
-              <a:t>multiplied </a:t>
-            </a:r>
-            <a:r>
-              <a:rPr lang="en-US" dirty="0" smtClean="0"/>
-              <a:t>with a special weight, are added up in the neuron</a:t>
-            </a:r>
-          </a:p>
-          <a:p>
-            <a:r>
-              <a:rPr lang="en-US" dirty="0" smtClean="0"/>
-              <a:t>If the sum reaches a special value, the neuron is being activated and ‚fires‘ a </a:t>
-            </a:r>
-            <a:r>
-              <a:rPr lang="en-US" dirty="0" smtClean="0"/>
-              <a:t>signal</a:t>
+              <a:t>If the sum reaches a special value, the neuron is being activated and ‚fires‘ a signal</a:t>
             </a:r>
           </a:p>
           <a:p>
@@ -10289,7 +11508,7 @@
           <a:p>
             <a:fld id="{B56A4490-B7AE-49FE-BF90-01EEF811007E}" type="datetime1">
               <a:rPr lang="de-DE" smtClean="0"/>
-              <a:t>02.12.2015</a:t>
+              <a:t>03.12.2015</a:t>
             </a:fld>
             <a:endParaRPr lang="de-DE"/>
           </a:p>
@@ -10799,7 +12018,7 @@
           <a:p>
             <a:fld id="{B56A4490-B7AE-49FE-BF90-01EEF811007E}" type="datetime1">
               <a:rPr lang="de-DE" smtClean="0"/>
-              <a:t>02.12.2015</a:t>
+              <a:t>03.12.2015</a:t>
             </a:fld>
             <a:endParaRPr lang="de-DE"/>
           </a:p>
@@ -13879,8 +15098,8 @@
           </a:p>
         </p:txBody>
       </p:sp>
-      <mc:AlternateContent xmlns:mc="http://schemas.openxmlformats.org/markup-compatibility/2006">
-        <mc:Choice xmlns:a14="http://schemas.microsoft.com/office/drawing/2010/main" Requires="a14">
+      <mc:AlternateContent xmlns:mc="http://schemas.openxmlformats.org/markup-compatibility/2006" xmlns:a14="http://schemas.microsoft.com/office/drawing/2010/main">
+        <mc:Choice Requires="a14">
           <p:sp>
             <p:nvSpPr>
               <p:cNvPr id="3" name="Inhaltsplatzhalter 2"/>
@@ -13916,11 +15135,7 @@
               <a:p>
                 <a:r>
                   <a:rPr lang="en-US" sz="2800" dirty="0" smtClean="0"/>
-                  <a:t>One sample is propagated trough the net and produces output </a:t>
-                </a:r>
-                <a:r>
-                  <a:rPr lang="en-US" sz="2800" dirty="0" smtClean="0"/>
-                  <a:t>vector</a:t>
+                  <a:t>One sample is propagated trough the net and produces output vector</a:t>
                 </a:r>
                 <a:br>
                   <a:rPr lang="en-US" sz="2800" dirty="0" smtClean="0"/>
@@ -14125,19 +15340,7 @@
               <a:p>
                 <a:r>
                   <a:rPr lang="en-US" sz="2800" dirty="0" smtClean="0"/>
-                  <a:t>Error </a:t>
-                </a:r>
-                <a:r>
-                  <a:rPr lang="en-US" sz="2800" dirty="0" smtClean="0"/>
-                  <a:t>for every output </a:t>
-                </a:r>
-                <a:r>
-                  <a:rPr lang="en-US" sz="2800" dirty="0" smtClean="0"/>
-                  <a:t>unit is </a:t>
-                </a:r>
-                <a:r>
-                  <a:rPr lang="en-US" sz="2800" dirty="0" smtClean="0"/>
-                  <a:t>calculated:</a:t>
+                  <a:t>Error for every output unit is calculated:</a:t>
                 </a:r>
                 <a:r>
                   <a:rPr lang="de-DE" sz="2800" dirty="0" smtClean="0"/>
@@ -14321,7 +15524,7 @@
             </p:txBody>
           </p:sp>
         </mc:Choice>
-        <mc:Fallback>
+        <mc:Fallback xmlns="">
           <p:sp>
             <p:nvSpPr>
               <p:cNvPr id="3" name="Inhaltsplatzhalter 2"/>
@@ -14376,7 +15579,7 @@
           <a:p>
             <a:fld id="{B56A4490-B7AE-49FE-BF90-01EEF811007E}" type="datetime1">
               <a:rPr lang="de-DE" smtClean="0"/>
-              <a:t>02.12.2015</a:t>
+              <a:t>03.12.2015</a:t>
             </a:fld>
             <a:endParaRPr lang="de-DE"/>
           </a:p>
@@ -14661,8 +15864,8 @@
           </a:p>
         </p:txBody>
       </p:sp>
-      <mc:AlternateContent xmlns:mc="http://schemas.openxmlformats.org/markup-compatibility/2006">
-        <mc:Choice xmlns:a14="http://schemas.microsoft.com/office/drawing/2010/main" Requires="a14">
+      <mc:AlternateContent xmlns:mc="http://schemas.openxmlformats.org/markup-compatibility/2006" xmlns:a14="http://schemas.microsoft.com/office/drawing/2010/main">
+        <mc:Choice Requires="a14">
           <p:sp>
             <p:nvSpPr>
               <p:cNvPr id="3" name="Inhaltsplatzhalter 2"/>
@@ -14691,15 +15894,7 @@
               <a:p>
                 <a:r>
                   <a:rPr lang="en-US" sz="2800" dirty="0" smtClean="0"/>
-                  <a:t>According to the error every weight - connected to current output </a:t>
-                </a:r>
-                <a:r>
-                  <a:rPr lang="en-US" sz="2800" dirty="0" smtClean="0"/>
-                  <a:t>(j) </a:t>
-                </a:r>
-                <a:r>
-                  <a:rPr lang="en-US" sz="2800" dirty="0" smtClean="0"/>
-                  <a:t>- is changed:</a:t>
+                  <a:t>According to the error every weight - connected to current output (j) - is changed:</a:t>
                 </a:r>
                 <a:br>
                   <a:rPr lang="en-US" sz="2800" dirty="0" smtClean="0"/>
@@ -15128,7 +16323,7 @@
             </p:txBody>
           </p:sp>
         </mc:Choice>
-        <mc:Fallback>
+        <mc:Fallback xmlns="">
           <p:sp>
             <p:nvSpPr>
               <p:cNvPr id="3" name="Inhaltsplatzhalter 2"/>
@@ -15179,7 +16374,7 @@
           <a:p>
             <a:fld id="{B56A4490-B7AE-49FE-BF90-01EEF811007E}" type="datetime1">
               <a:rPr lang="de-DE" smtClean="0"/>
-              <a:t>02.12.2015</a:t>
+              <a:t>03.12.2015</a:t>
             </a:fld>
             <a:endParaRPr lang="de-DE"/>
           </a:p>

</xml_diff>